<commit_message>
finalized the installation procedure
</commit_message>
<xml_diff>
--- a/Anaconda-DEE-2023-2024/images/Screenshots.pptx
+++ b/Anaconda-DEE-2023-2024/images/Screenshots.pptx
@@ -5,7 +5,7 @@
     <p:sldMasterId id="2147483648" r:id="rId1"/>
   </p:sldMasterIdLst>
   <p:notesMasterIdLst>
-    <p:notesMasterId r:id="rId12"/>
+    <p:notesMasterId r:id="rId13"/>
   </p:notesMasterIdLst>
   <p:sldIdLst>
     <p:sldId id="256" r:id="rId2"/>
@@ -16,8 +16,9 @@
     <p:sldId id="261" r:id="rId7"/>
     <p:sldId id="262" r:id="rId8"/>
     <p:sldId id="263" r:id="rId9"/>
-    <p:sldId id="264" r:id="rId10"/>
-    <p:sldId id="265" r:id="rId11"/>
+    <p:sldId id="266" r:id="rId10"/>
+    <p:sldId id="264" r:id="rId11"/>
+    <p:sldId id="265" r:id="rId12"/>
   </p:sldIdLst>
   <p:sldSz cx="9144000" cy="6858000" type="screen4x3"/>
   <p:notesSz cx="6858000" cy="9144000"/>
@@ -116,6 +117,22 @@
       </a:defRPr>
     </a:lvl9pPr>
   </p:defaultTextStyle>
+  <p:extLst>
+    <p:ext uri="{EFAFB233-063F-42B5-8137-9DF3F51BA10A}">
+      <p15:sldGuideLst xmlns:p15="http://schemas.microsoft.com/office/powerpoint/2012/main">
+        <p15:guide id="1" orient="horz" pos="2160">
+          <p15:clr>
+            <a:srgbClr val="A4A3A4"/>
+          </p15:clr>
+        </p15:guide>
+        <p15:guide id="2" pos="2880">
+          <p15:clr>
+            <a:srgbClr val="A4A3A4"/>
+          </p15:clr>
+        </p15:guide>
+      </p15:sldGuideLst>
+    </p:ext>
+  </p:extLst>
 </p:presentation>
 </file>
 
@@ -201,7 +218,7 @@
           <a:p>
             <a:fld id="{0966D3B8-52E3-4AB3-BCE4-71A9ACD4FC85}" type="datetimeFigureOut">
               <a:rPr lang="en-US" smtClean="0"/>
-              <a:t>7/14/2023</a:t>
+              <a:t>7/19/2023</a:t>
             </a:fld>
             <a:endParaRPr lang="en-US"/>
           </a:p>
@@ -834,7 +851,7 @@
           <a:p>
             <a:fld id="{1B801FFB-CF9F-4BD2-8F6F-124599E547F0}" type="datetimeFigureOut">
               <a:rPr lang="en-US" smtClean="0"/>
-              <a:t>7/14/2023</a:t>
+              <a:t>7/19/2023</a:t>
             </a:fld>
             <a:endParaRPr lang="en-US"/>
           </a:p>
@@ -1004,7 +1021,7 @@
           <a:p>
             <a:fld id="{1B801FFB-CF9F-4BD2-8F6F-124599E547F0}" type="datetimeFigureOut">
               <a:rPr lang="en-US" smtClean="0"/>
-              <a:t>7/14/2023</a:t>
+              <a:t>7/19/2023</a:t>
             </a:fld>
             <a:endParaRPr lang="en-US"/>
           </a:p>
@@ -1184,7 +1201,7 @@
           <a:p>
             <a:fld id="{1B801FFB-CF9F-4BD2-8F6F-124599E547F0}" type="datetimeFigureOut">
               <a:rPr lang="en-US" smtClean="0"/>
-              <a:t>7/14/2023</a:t>
+              <a:t>7/19/2023</a:t>
             </a:fld>
             <a:endParaRPr lang="en-US"/>
           </a:p>
@@ -1354,7 +1371,7 @@
           <a:p>
             <a:fld id="{1B801FFB-CF9F-4BD2-8F6F-124599E547F0}" type="datetimeFigureOut">
               <a:rPr lang="en-US" smtClean="0"/>
-              <a:t>7/14/2023</a:t>
+              <a:t>7/19/2023</a:t>
             </a:fld>
             <a:endParaRPr lang="en-US"/>
           </a:p>
@@ -1600,7 +1617,7 @@
           <a:p>
             <a:fld id="{1B801FFB-CF9F-4BD2-8F6F-124599E547F0}" type="datetimeFigureOut">
               <a:rPr lang="en-US" smtClean="0"/>
-              <a:t>7/14/2023</a:t>
+              <a:t>7/19/2023</a:t>
             </a:fld>
             <a:endParaRPr lang="en-US"/>
           </a:p>
@@ -1888,7 +1905,7 @@
           <a:p>
             <a:fld id="{1B801FFB-CF9F-4BD2-8F6F-124599E547F0}" type="datetimeFigureOut">
               <a:rPr lang="en-US" smtClean="0"/>
-              <a:t>7/14/2023</a:t>
+              <a:t>7/19/2023</a:t>
             </a:fld>
             <a:endParaRPr lang="en-US"/>
           </a:p>
@@ -2310,7 +2327,7 @@
           <a:p>
             <a:fld id="{1B801FFB-CF9F-4BD2-8F6F-124599E547F0}" type="datetimeFigureOut">
               <a:rPr lang="en-US" smtClean="0"/>
-              <a:t>7/14/2023</a:t>
+              <a:t>7/19/2023</a:t>
             </a:fld>
             <a:endParaRPr lang="en-US"/>
           </a:p>
@@ -2428,7 +2445,7 @@
           <a:p>
             <a:fld id="{1B801FFB-CF9F-4BD2-8F6F-124599E547F0}" type="datetimeFigureOut">
               <a:rPr lang="en-US" smtClean="0"/>
-              <a:t>7/14/2023</a:t>
+              <a:t>7/19/2023</a:t>
             </a:fld>
             <a:endParaRPr lang="en-US"/>
           </a:p>
@@ -2523,7 +2540,7 @@
           <a:p>
             <a:fld id="{1B801FFB-CF9F-4BD2-8F6F-124599E547F0}" type="datetimeFigureOut">
               <a:rPr lang="en-US" smtClean="0"/>
-              <a:t>7/14/2023</a:t>
+              <a:t>7/19/2023</a:t>
             </a:fld>
             <a:endParaRPr lang="en-US"/>
           </a:p>
@@ -2800,7 +2817,7 @@
           <a:p>
             <a:fld id="{1B801FFB-CF9F-4BD2-8F6F-124599E547F0}" type="datetimeFigureOut">
               <a:rPr lang="en-US" smtClean="0"/>
-              <a:t>7/14/2023</a:t>
+              <a:t>7/19/2023</a:t>
             </a:fld>
             <a:endParaRPr lang="en-US"/>
           </a:p>
@@ -3053,7 +3070,7 @@
           <a:p>
             <a:fld id="{1B801FFB-CF9F-4BD2-8F6F-124599E547F0}" type="datetimeFigureOut">
               <a:rPr lang="en-US" smtClean="0"/>
-              <a:t>7/14/2023</a:t>
+              <a:t>7/19/2023</a:t>
             </a:fld>
             <a:endParaRPr lang="en-US"/>
           </a:p>
@@ -3266,7 +3283,7 @@
           <a:p>
             <a:fld id="{1B801FFB-CF9F-4BD2-8F6F-124599E547F0}" type="datetimeFigureOut">
               <a:rPr lang="en-US" smtClean="0"/>
-              <a:t>7/14/2023</a:t>
+              <a:t>7/19/2023</a:t>
             </a:fld>
             <a:endParaRPr lang="en-US"/>
           </a:p>
@@ -3689,10 +3706,139 @@
   <p:clrMapOvr>
     <a:masterClrMapping/>
   </p:clrMapOvr>
+  <p:timing>
+    <p:tnLst>
+      <p:par>
+        <p:cTn id="1" dur="indefinite" restart="never" nodeType="tmRoot"/>
+      </p:par>
+    </p:tnLst>
+  </p:timing>
 </p:sld>
 </file>
 
 <file path=ppt/slides/slide10.xml><?xml version="1.0" encoding="utf-8"?>
+<p:sld xmlns:a="http://schemas.openxmlformats.org/drawingml/2006/main" xmlns:r="http://schemas.openxmlformats.org/officeDocument/2006/relationships" xmlns:p="http://schemas.openxmlformats.org/presentationml/2006/main">
+  <p:cSld>
+    <p:spTree>
+      <p:nvGrpSpPr>
+        <p:cNvPr id="1" name=""/>
+        <p:cNvGrpSpPr/>
+        <p:nvPr/>
+      </p:nvGrpSpPr>
+      <p:grpSpPr>
+        <a:xfrm>
+          <a:off x="0" y="0"/>
+          <a:ext cx="0" cy="0"/>
+          <a:chOff x="0" y="0"/>
+          <a:chExt cx="0" cy="0"/>
+        </a:xfrm>
+      </p:grpSpPr>
+      <p:sp>
+        <p:nvSpPr>
+          <p:cNvPr id="2" name="Title 1"/>
+          <p:cNvSpPr>
+            <a:spLocks noGrp="1"/>
+          </p:cNvSpPr>
+          <p:nvPr>
+            <p:ph type="title"/>
+          </p:nvPr>
+        </p:nvSpPr>
+        <p:spPr/>
+        <p:txBody>
+          <a:bodyPr/>
+          <a:lstStyle/>
+          <a:p>
+            <a:endParaRPr lang="en-US"/>
+          </a:p>
+        </p:txBody>
+      </p:sp>
+      <p:pic>
+        <p:nvPicPr>
+          <p:cNvPr id="2050" name="Picture 2"/>
+          <p:cNvPicPr>
+            <a:picLocks noGrp="1" noChangeAspect="1" noChangeArrowheads="1"/>
+          </p:cNvPicPr>
+          <p:nvPr>
+            <p:ph idx="1"/>
+          </p:nvPr>
+        </p:nvPicPr>
+        <p:blipFill>
+          <a:blip r:embed="rId2">
+            <a:extLst>
+              <a:ext uri="{28A0092B-C50C-407E-A947-70E740481C1C}">
+                <a14:useLocalDpi xmlns:a14="http://schemas.microsoft.com/office/drawing/2010/main" val="0"/>
+              </a:ext>
+            </a:extLst>
+          </a:blip>
+          <a:srcRect/>
+          <a:stretch>
+            <a:fillRect/>
+          </a:stretch>
+        </p:blipFill>
+        <p:spPr bwMode="auto">
+          <a:xfrm>
+            <a:off x="2285681" y="2562837"/>
+            <a:ext cx="4572638" cy="2600688"/>
+          </a:xfrm>
+          <a:prstGeom prst="rect">
+            <a:avLst/>
+          </a:prstGeom>
+          <a:noFill/>
+          <a:ln>
+            <a:noFill/>
+          </a:ln>
+          <a:effectLst/>
+          <a:extLst>
+            <a:ext uri="{909E8E84-426E-40DD-AFC4-6F175D3DCCD1}">
+              <a14:hiddenFill xmlns:a14="http://schemas.microsoft.com/office/drawing/2010/main">
+                <a:solidFill>
+                  <a:schemeClr val="accent1"/>
+                </a:solidFill>
+              </a14:hiddenFill>
+            </a:ext>
+            <a:ext uri="{91240B29-F687-4F45-9708-019B960494DF}">
+              <a14:hiddenLine xmlns:a14="http://schemas.microsoft.com/office/drawing/2010/main" w="9525">
+                <a:solidFill>
+                  <a:schemeClr val="tx1"/>
+                </a:solidFill>
+                <a:miter lim="800000"/>
+                <a:headEnd/>
+                <a:tailEnd/>
+              </a14:hiddenLine>
+            </a:ext>
+            <a:ext uri="{AF507438-7753-43E0-B8FC-AC1667EBCBE1}">
+              <a14:hiddenEffects xmlns:a14="http://schemas.microsoft.com/office/drawing/2010/main">
+                <a:effectLst>
+                  <a:outerShdw dist="35921" dir="2700000" algn="ctr" rotWithShape="0">
+                    <a:schemeClr val="bg2"/>
+                  </a:outerShdw>
+                </a:effectLst>
+              </a14:hiddenEffects>
+            </a:ext>
+          </a:extLst>
+        </p:spPr>
+      </p:pic>
+    </p:spTree>
+    <p:extLst>
+      <p:ext uri="{BB962C8B-B14F-4D97-AF65-F5344CB8AC3E}">
+        <p14:creationId xmlns:p14="http://schemas.microsoft.com/office/powerpoint/2010/main" val="2154510251"/>
+      </p:ext>
+    </p:extLst>
+  </p:cSld>
+  <p:clrMapOvr>
+    <a:masterClrMapping/>
+  </p:clrMapOvr>
+  <p:timing>
+    <p:tnLst>
+      <p:par>
+        <p:cTn id="1" dur="indefinite" restart="never" nodeType="tmRoot"/>
+      </p:par>
+    </p:tnLst>
+  </p:timing>
+</p:sld>
+</file>
+
+<file path=ppt/slides/slide11.xml><?xml version="1.0" encoding="utf-8"?>
 <p:sld xmlns:a="http://schemas.openxmlformats.org/drawingml/2006/main" xmlns:r="http://schemas.openxmlformats.org/officeDocument/2006/relationships" xmlns:p="http://schemas.openxmlformats.org/presentationml/2006/main">
   <p:cSld>
     <p:spTree>
@@ -3908,6 +4054,13 @@
   <p:clrMapOvr>
     <a:masterClrMapping/>
   </p:clrMapOvr>
+  <p:timing>
+    <p:tnLst>
+      <p:par>
+        <p:cTn id="1" dur="indefinite" restart="never" nodeType="tmRoot"/>
+      </p:par>
+    </p:tnLst>
+  </p:timing>
 </p:sld>
 </file>
 
@@ -4827,6 +4980,13 @@
   <p:clrMapOvr>
     <a:masterClrMapping/>
   </p:clrMapOvr>
+  <p:timing>
+    <p:tnLst>
+      <p:par>
+        <p:cTn id="1" dur="indefinite" restart="never" nodeType="tmRoot"/>
+      </p:par>
+    </p:tnLst>
+  </p:timing>
 </p:sld>
 </file>
 
@@ -4862,86 +5022,61 @@
           <a:bodyPr/>
           <a:lstStyle/>
           <a:p>
-            <a:endParaRPr lang="en-US"/>
+            <a:r>
+              <a:rPr lang="en-US" dirty="0" smtClean="0"/>
+              <a:t>2023.07-1 </a:t>
+            </a:r>
+            <a:r>
+              <a:rPr lang="en-US" dirty="0" smtClean="0"/>
+              <a:t>Navigator window</a:t>
+            </a:r>
+            <a:endParaRPr lang="en-US" dirty="0"/>
           </a:p>
         </p:txBody>
       </p:sp>
       <p:pic>
         <p:nvPicPr>
-          <p:cNvPr id="2050" name="Picture 2"/>
+          <p:cNvPr id="4" name="Content Placeholder 3"/>
           <p:cNvPicPr>
-            <a:picLocks noGrp="1" noChangeAspect="1" noChangeArrowheads="1"/>
+            <a:picLocks noGrp="1" noChangeAspect="1"/>
           </p:cNvPicPr>
           <p:nvPr>
             <p:ph idx="1"/>
           </p:nvPr>
         </p:nvPicPr>
         <p:blipFill>
-          <a:blip r:embed="rId2">
-            <a:extLst>
-              <a:ext uri="{28A0092B-C50C-407E-A947-70E740481C1C}">
-                <a14:useLocalDpi xmlns:a14="http://schemas.microsoft.com/office/drawing/2010/main" val="0"/>
-              </a:ext>
-            </a:extLst>
-          </a:blip>
-          <a:srcRect/>
+          <a:blip r:embed="rId2"/>
           <a:stretch>
             <a:fillRect/>
           </a:stretch>
         </p:blipFill>
-        <p:spPr bwMode="auto">
+        <p:spPr>
           <a:xfrm>
-            <a:off x="2285681" y="2562837"/>
-            <a:ext cx="4572638" cy="2600688"/>
+            <a:off x="716550" y="1600200"/>
+            <a:ext cx="7710899" cy="4525963"/>
           </a:xfrm>
           <a:prstGeom prst="rect">
             <a:avLst/>
           </a:prstGeom>
-          <a:noFill/>
-          <a:ln>
-            <a:noFill/>
-          </a:ln>
-          <a:effectLst/>
-          <a:extLst>
-            <a:ext uri="{909E8E84-426E-40DD-AFC4-6F175D3DCCD1}">
-              <a14:hiddenFill xmlns:a14="http://schemas.microsoft.com/office/drawing/2010/main">
-                <a:solidFill>
-                  <a:schemeClr val="accent1"/>
-                </a:solidFill>
-              </a14:hiddenFill>
-            </a:ext>
-            <a:ext uri="{91240B29-F687-4F45-9708-019B960494DF}">
-              <a14:hiddenLine xmlns:a14="http://schemas.microsoft.com/office/drawing/2010/main" w="9525">
-                <a:solidFill>
-                  <a:schemeClr val="tx1"/>
-                </a:solidFill>
-                <a:miter lim="800000"/>
-                <a:headEnd/>
-                <a:tailEnd/>
-              </a14:hiddenLine>
-            </a:ext>
-            <a:ext uri="{AF507438-7753-43E0-B8FC-AC1667EBCBE1}">
-              <a14:hiddenEffects xmlns:a14="http://schemas.microsoft.com/office/drawing/2010/main">
-                <a:effectLst>
-                  <a:outerShdw dist="35921" dir="2700000" algn="ctr" rotWithShape="0">
-                    <a:schemeClr val="bg2"/>
-                  </a:outerShdw>
-                </a:effectLst>
-              </a14:hiddenEffects>
-            </a:ext>
-          </a:extLst>
         </p:spPr>
       </p:pic>
     </p:spTree>
     <p:extLst>
       <p:ext uri="{BB962C8B-B14F-4D97-AF65-F5344CB8AC3E}">
-        <p14:creationId xmlns:p14="http://schemas.microsoft.com/office/powerpoint/2010/main" val="2154510251"/>
+        <p14:creationId xmlns:p14="http://schemas.microsoft.com/office/powerpoint/2010/main" val="4217037158"/>
       </p:ext>
     </p:extLst>
   </p:cSld>
   <p:clrMapOvr>
     <a:masterClrMapping/>
   </p:clrMapOvr>
+  <p:timing>
+    <p:tnLst>
+      <p:par>
+        <p:cTn id="1" dur="indefinite" restart="never" nodeType="tmRoot"/>
+      </p:par>
+    </p:tnLst>
+  </p:timing>
 </p:sld>
 </file>
 

</xml_diff>